<commit_message>
6 Radial Menu Works
</commit_message>
<xml_diff>
--- a/Display/Assets/Resources/6Menu/6RadialMenu.pptx
+++ b/Display/Assets/Resources/6Menu/6RadialMenu.pptx
@@ -251,7 +251,7 @@
           <a:p>
             <a:fld id="{BEE7E944-CEF1-45FA-9FF6-4A45AB75AB6E}" type="datetimeFigureOut">
               <a:rPr lang="zh-CN" altLang="en-US" smtClean="0"/>
-              <a:t>2018/8/15</a:t>
+              <a:t>2018/8/16</a:t>
             </a:fld>
             <a:endParaRPr lang="zh-CN" altLang="en-US"/>
           </a:p>
@@ -421,7 +421,7 @@
           <a:p>
             <a:fld id="{BEE7E944-CEF1-45FA-9FF6-4A45AB75AB6E}" type="datetimeFigureOut">
               <a:rPr lang="zh-CN" altLang="en-US" smtClean="0"/>
-              <a:t>2018/8/15</a:t>
+              <a:t>2018/8/16</a:t>
             </a:fld>
             <a:endParaRPr lang="zh-CN" altLang="en-US"/>
           </a:p>
@@ -601,7 +601,7 @@
           <a:p>
             <a:fld id="{BEE7E944-CEF1-45FA-9FF6-4A45AB75AB6E}" type="datetimeFigureOut">
               <a:rPr lang="zh-CN" altLang="en-US" smtClean="0"/>
-              <a:t>2018/8/15</a:t>
+              <a:t>2018/8/16</a:t>
             </a:fld>
             <a:endParaRPr lang="zh-CN" altLang="en-US"/>
           </a:p>
@@ -771,7 +771,7 @@
           <a:p>
             <a:fld id="{BEE7E944-CEF1-45FA-9FF6-4A45AB75AB6E}" type="datetimeFigureOut">
               <a:rPr lang="zh-CN" altLang="en-US" smtClean="0"/>
-              <a:t>2018/8/15</a:t>
+              <a:t>2018/8/16</a:t>
             </a:fld>
             <a:endParaRPr lang="zh-CN" altLang="en-US"/>
           </a:p>
@@ -1015,7 +1015,7 @@
           <a:p>
             <a:fld id="{BEE7E944-CEF1-45FA-9FF6-4A45AB75AB6E}" type="datetimeFigureOut">
               <a:rPr lang="zh-CN" altLang="en-US" smtClean="0"/>
-              <a:t>2018/8/15</a:t>
+              <a:t>2018/8/16</a:t>
             </a:fld>
             <a:endParaRPr lang="zh-CN" altLang="en-US"/>
           </a:p>
@@ -1247,7 +1247,7 @@
           <a:p>
             <a:fld id="{BEE7E944-CEF1-45FA-9FF6-4A45AB75AB6E}" type="datetimeFigureOut">
               <a:rPr lang="zh-CN" altLang="en-US" smtClean="0"/>
-              <a:t>2018/8/15</a:t>
+              <a:t>2018/8/16</a:t>
             </a:fld>
             <a:endParaRPr lang="zh-CN" altLang="en-US"/>
           </a:p>
@@ -1614,7 +1614,7 @@
           <a:p>
             <a:fld id="{BEE7E944-CEF1-45FA-9FF6-4A45AB75AB6E}" type="datetimeFigureOut">
               <a:rPr lang="zh-CN" altLang="en-US" smtClean="0"/>
-              <a:t>2018/8/15</a:t>
+              <a:t>2018/8/16</a:t>
             </a:fld>
             <a:endParaRPr lang="zh-CN" altLang="en-US"/>
           </a:p>
@@ -1732,7 +1732,7 @@
           <a:p>
             <a:fld id="{BEE7E944-CEF1-45FA-9FF6-4A45AB75AB6E}" type="datetimeFigureOut">
               <a:rPr lang="zh-CN" altLang="en-US" smtClean="0"/>
-              <a:t>2018/8/15</a:t>
+              <a:t>2018/8/16</a:t>
             </a:fld>
             <a:endParaRPr lang="zh-CN" altLang="en-US"/>
           </a:p>
@@ -1827,7 +1827,7 @@
           <a:p>
             <a:fld id="{BEE7E944-CEF1-45FA-9FF6-4A45AB75AB6E}" type="datetimeFigureOut">
               <a:rPr lang="zh-CN" altLang="en-US" smtClean="0"/>
-              <a:t>2018/8/15</a:t>
+              <a:t>2018/8/16</a:t>
             </a:fld>
             <a:endParaRPr lang="zh-CN" altLang="en-US"/>
           </a:p>
@@ -2104,7 +2104,7 @@
           <a:p>
             <a:fld id="{BEE7E944-CEF1-45FA-9FF6-4A45AB75AB6E}" type="datetimeFigureOut">
               <a:rPr lang="zh-CN" altLang="en-US" smtClean="0"/>
-              <a:t>2018/8/15</a:t>
+              <a:t>2018/8/16</a:t>
             </a:fld>
             <a:endParaRPr lang="zh-CN" altLang="en-US"/>
           </a:p>
@@ -2361,7 +2361,7 @@
           <a:p>
             <a:fld id="{BEE7E944-CEF1-45FA-9FF6-4A45AB75AB6E}" type="datetimeFigureOut">
               <a:rPr lang="zh-CN" altLang="en-US" smtClean="0"/>
-              <a:t>2018/8/15</a:t>
+              <a:t>2018/8/16</a:t>
             </a:fld>
             <a:endParaRPr lang="zh-CN" altLang="en-US"/>
           </a:p>
@@ -2574,7 +2574,7 @@
           <a:p>
             <a:fld id="{BEE7E944-CEF1-45FA-9FF6-4A45AB75AB6E}" type="datetimeFigureOut">
               <a:rPr lang="zh-CN" altLang="en-US" smtClean="0"/>
-              <a:t>2018/8/15</a:t>
+              <a:t>2018/8/16</a:t>
             </a:fld>
             <a:endParaRPr lang="zh-CN" altLang="en-US"/>
           </a:p>
@@ -3022,7 +3022,7 @@
     </p:spTree>
     <p:extLst>
       <p:ext uri="{BB962C8B-B14F-4D97-AF65-F5344CB8AC3E}">
-        <p14:creationId xmlns:p14="http://schemas.microsoft.com/office/powerpoint/2010/main" val="1722211357"/>
+        <p14:creationId xmlns:p14="http://schemas.microsoft.com/office/powerpoint/2010/main" val="3159595177"/>
       </p:ext>
     </p:extLst>
   </p:cSld>
@@ -3797,7 +3797,7 @@
         </p:nvCxnSpPr>
         <p:spPr>
           <a:xfrm flipH="1">
-            <a:off x="966339" y="5399881"/>
+            <a:off x="1125993" y="5399881"/>
             <a:ext cx="1675987" cy="0"/>
           </a:xfrm>
           <a:prstGeom prst="straightConnector1">
@@ -4358,42 +4358,6 @@
           </a:fontRef>
         </p:style>
       </p:cxnSp>
-      <p:cxnSp>
-        <p:nvCxnSpPr>
-          <p:cNvPr id="3" name="直接箭头连接符 2"/>
-          <p:cNvCxnSpPr/>
-          <p:nvPr/>
-        </p:nvCxnSpPr>
-        <p:spPr>
-          <a:xfrm flipH="1">
-            <a:off x="966339" y="5399881"/>
-            <a:ext cx="1675987" cy="0"/>
-          </a:xfrm>
-          <a:prstGeom prst="straightConnector1">
-            <a:avLst/>
-          </a:prstGeom>
-          <a:ln w="57150">
-            <a:solidFill>
-              <a:srgbClr val="010101"/>
-            </a:solidFill>
-            <a:tailEnd type="triangle" w="lg" len="lg"/>
-          </a:ln>
-        </p:spPr>
-        <p:style>
-          <a:lnRef idx="1">
-            <a:schemeClr val="accent1"/>
-          </a:lnRef>
-          <a:fillRef idx="0">
-            <a:schemeClr val="accent1"/>
-          </a:fillRef>
-          <a:effectRef idx="0">
-            <a:schemeClr val="accent1"/>
-          </a:effectRef>
-          <a:fontRef idx="minor">
-            <a:schemeClr val="tx1"/>
-          </a:fontRef>
-        </p:style>
-      </p:cxnSp>
       <p:sp>
         <p:nvSpPr>
           <p:cNvPr id="10" name="椭圆 9"/>
@@ -4640,6 +4604,42 @@
           </a:p>
         </p:txBody>
       </p:sp>
+      <p:cxnSp>
+        <p:nvCxnSpPr>
+          <p:cNvPr id="16" name="直接箭头连接符 15"/>
+          <p:cNvCxnSpPr/>
+          <p:nvPr/>
+        </p:nvCxnSpPr>
+        <p:spPr>
+          <a:xfrm flipH="1">
+            <a:off x="1125993" y="5399881"/>
+            <a:ext cx="1675987" cy="0"/>
+          </a:xfrm>
+          <a:prstGeom prst="straightConnector1">
+            <a:avLst/>
+          </a:prstGeom>
+          <a:ln w="57150">
+            <a:solidFill>
+              <a:srgbClr val="010101"/>
+            </a:solidFill>
+            <a:tailEnd type="triangle" w="lg" len="lg"/>
+          </a:ln>
+        </p:spPr>
+        <p:style>
+          <a:lnRef idx="1">
+            <a:schemeClr val="accent1"/>
+          </a:lnRef>
+          <a:fillRef idx="0">
+            <a:schemeClr val="accent1"/>
+          </a:fillRef>
+          <a:effectRef idx="0">
+            <a:schemeClr val="accent1"/>
+          </a:effectRef>
+          <a:fontRef idx="minor">
+            <a:schemeClr val="tx1"/>
+          </a:fontRef>
+        </p:style>
+      </p:cxnSp>
     </p:spTree>
     <p:extLst>
       <p:ext uri="{BB962C8B-B14F-4D97-AF65-F5344CB8AC3E}">
@@ -4927,42 +4927,6 @@
           </a:fontRef>
         </p:style>
       </p:cxnSp>
-      <p:cxnSp>
-        <p:nvCxnSpPr>
-          <p:cNvPr id="3" name="直接箭头连接符 2"/>
-          <p:cNvCxnSpPr/>
-          <p:nvPr/>
-        </p:nvCxnSpPr>
-        <p:spPr>
-          <a:xfrm flipH="1">
-            <a:off x="966339" y="5399881"/>
-            <a:ext cx="1675987" cy="0"/>
-          </a:xfrm>
-          <a:prstGeom prst="straightConnector1">
-            <a:avLst/>
-          </a:prstGeom>
-          <a:ln w="57150">
-            <a:solidFill>
-              <a:srgbClr val="010101"/>
-            </a:solidFill>
-            <a:tailEnd type="triangle" w="lg" len="lg"/>
-          </a:ln>
-        </p:spPr>
-        <p:style>
-          <a:lnRef idx="1">
-            <a:schemeClr val="accent1"/>
-          </a:lnRef>
-          <a:fillRef idx="0">
-            <a:schemeClr val="accent1"/>
-          </a:fillRef>
-          <a:effectRef idx="0">
-            <a:schemeClr val="accent1"/>
-          </a:effectRef>
-          <a:fontRef idx="minor">
-            <a:schemeClr val="tx1"/>
-          </a:fontRef>
-        </p:style>
-      </p:cxnSp>
       <p:sp>
         <p:nvSpPr>
           <p:cNvPr id="10" name="椭圆 9"/>
@@ -5209,6 +5173,42 @@
           </a:p>
         </p:txBody>
       </p:sp>
+      <p:cxnSp>
+        <p:nvCxnSpPr>
+          <p:cNvPr id="16" name="直接箭头连接符 15"/>
+          <p:cNvCxnSpPr/>
+          <p:nvPr/>
+        </p:nvCxnSpPr>
+        <p:spPr>
+          <a:xfrm flipH="1">
+            <a:off x="1125993" y="5399881"/>
+            <a:ext cx="1675987" cy="0"/>
+          </a:xfrm>
+          <a:prstGeom prst="straightConnector1">
+            <a:avLst/>
+          </a:prstGeom>
+          <a:ln w="57150">
+            <a:solidFill>
+              <a:srgbClr val="010101"/>
+            </a:solidFill>
+            <a:tailEnd type="triangle" w="lg" len="lg"/>
+          </a:ln>
+        </p:spPr>
+        <p:style>
+          <a:lnRef idx="1">
+            <a:schemeClr val="accent1"/>
+          </a:lnRef>
+          <a:fillRef idx="0">
+            <a:schemeClr val="accent1"/>
+          </a:fillRef>
+          <a:effectRef idx="0">
+            <a:schemeClr val="accent1"/>
+          </a:effectRef>
+          <a:fontRef idx="minor">
+            <a:schemeClr val="tx1"/>
+          </a:fontRef>
+        </p:style>
+      </p:cxnSp>
     </p:spTree>
     <p:extLst>
       <p:ext uri="{BB962C8B-B14F-4D97-AF65-F5344CB8AC3E}">
@@ -5559,42 +5559,6 @@
           </a:fontRef>
         </p:style>
       </p:cxnSp>
-      <p:cxnSp>
-        <p:nvCxnSpPr>
-          <p:cNvPr id="3" name="直接箭头连接符 2"/>
-          <p:cNvCxnSpPr/>
-          <p:nvPr/>
-        </p:nvCxnSpPr>
-        <p:spPr>
-          <a:xfrm flipH="1">
-            <a:off x="966339" y="5399881"/>
-            <a:ext cx="1675987" cy="0"/>
-          </a:xfrm>
-          <a:prstGeom prst="straightConnector1">
-            <a:avLst/>
-          </a:prstGeom>
-          <a:ln w="57150">
-            <a:solidFill>
-              <a:srgbClr val="010101"/>
-            </a:solidFill>
-            <a:tailEnd type="triangle" w="lg" len="lg"/>
-          </a:ln>
-        </p:spPr>
-        <p:style>
-          <a:lnRef idx="1">
-            <a:schemeClr val="accent1"/>
-          </a:lnRef>
-          <a:fillRef idx="0">
-            <a:schemeClr val="accent1"/>
-          </a:fillRef>
-          <a:effectRef idx="0">
-            <a:schemeClr val="accent1"/>
-          </a:effectRef>
-          <a:fontRef idx="minor">
-            <a:schemeClr val="tx1"/>
-          </a:fontRef>
-        </p:style>
-      </p:cxnSp>
       <p:sp>
         <p:nvSpPr>
           <p:cNvPr id="10" name="椭圆 9"/>
@@ -5841,6 +5805,42 @@
           </a:p>
         </p:txBody>
       </p:sp>
+      <p:cxnSp>
+        <p:nvCxnSpPr>
+          <p:cNvPr id="25" name="直接箭头连接符 24"/>
+          <p:cNvCxnSpPr/>
+          <p:nvPr/>
+        </p:nvCxnSpPr>
+        <p:spPr>
+          <a:xfrm flipH="1">
+            <a:off x="1125993" y="5399881"/>
+            <a:ext cx="1675987" cy="0"/>
+          </a:xfrm>
+          <a:prstGeom prst="straightConnector1">
+            <a:avLst/>
+          </a:prstGeom>
+          <a:ln w="57150">
+            <a:solidFill>
+              <a:srgbClr val="010101"/>
+            </a:solidFill>
+            <a:tailEnd type="triangle" w="lg" len="lg"/>
+          </a:ln>
+        </p:spPr>
+        <p:style>
+          <a:lnRef idx="1">
+            <a:schemeClr val="accent1"/>
+          </a:lnRef>
+          <a:fillRef idx="0">
+            <a:schemeClr val="accent1"/>
+          </a:fillRef>
+          <a:effectRef idx="0">
+            <a:schemeClr val="accent1"/>
+          </a:effectRef>
+          <a:fontRef idx="minor">
+            <a:schemeClr val="tx1"/>
+          </a:fontRef>
+        </p:style>
+      </p:cxnSp>
     </p:spTree>
     <p:extLst>
       <p:ext uri="{BB962C8B-B14F-4D97-AF65-F5344CB8AC3E}">
@@ -6191,42 +6191,6 @@
           </a:fontRef>
         </p:style>
       </p:cxnSp>
-      <p:cxnSp>
-        <p:nvCxnSpPr>
-          <p:cNvPr id="3" name="直接箭头连接符 2"/>
-          <p:cNvCxnSpPr/>
-          <p:nvPr/>
-        </p:nvCxnSpPr>
-        <p:spPr>
-          <a:xfrm flipH="1">
-            <a:off x="966339" y="5399881"/>
-            <a:ext cx="1675987" cy="0"/>
-          </a:xfrm>
-          <a:prstGeom prst="straightConnector1">
-            <a:avLst/>
-          </a:prstGeom>
-          <a:ln w="57150">
-            <a:solidFill>
-              <a:srgbClr val="010101"/>
-            </a:solidFill>
-            <a:tailEnd type="triangle" w="lg" len="lg"/>
-          </a:ln>
-        </p:spPr>
-        <p:style>
-          <a:lnRef idx="1">
-            <a:schemeClr val="accent1"/>
-          </a:lnRef>
-          <a:fillRef idx="0">
-            <a:schemeClr val="accent1"/>
-          </a:fillRef>
-          <a:effectRef idx="0">
-            <a:schemeClr val="accent1"/>
-          </a:effectRef>
-          <a:fontRef idx="minor">
-            <a:schemeClr val="tx1"/>
-          </a:fontRef>
-        </p:style>
-      </p:cxnSp>
       <p:sp>
         <p:nvSpPr>
           <p:cNvPr id="10" name="椭圆 9"/>
@@ -6473,6 +6437,42 @@
           </a:p>
         </p:txBody>
       </p:sp>
+      <p:cxnSp>
+        <p:nvCxnSpPr>
+          <p:cNvPr id="20" name="直接箭头连接符 19"/>
+          <p:cNvCxnSpPr/>
+          <p:nvPr/>
+        </p:nvCxnSpPr>
+        <p:spPr>
+          <a:xfrm flipH="1">
+            <a:off x="1125993" y="5399881"/>
+            <a:ext cx="1675987" cy="0"/>
+          </a:xfrm>
+          <a:prstGeom prst="straightConnector1">
+            <a:avLst/>
+          </a:prstGeom>
+          <a:ln w="57150">
+            <a:solidFill>
+              <a:srgbClr val="010101"/>
+            </a:solidFill>
+            <a:tailEnd type="triangle" w="lg" len="lg"/>
+          </a:ln>
+        </p:spPr>
+        <p:style>
+          <a:lnRef idx="1">
+            <a:schemeClr val="accent1"/>
+          </a:lnRef>
+          <a:fillRef idx="0">
+            <a:schemeClr val="accent1"/>
+          </a:fillRef>
+          <a:effectRef idx="0">
+            <a:schemeClr val="accent1"/>
+          </a:effectRef>
+          <a:fontRef idx="minor">
+            <a:schemeClr val="tx1"/>
+          </a:fontRef>
+        </p:style>
+      </p:cxnSp>
     </p:spTree>
     <p:extLst>
       <p:ext uri="{BB962C8B-B14F-4D97-AF65-F5344CB8AC3E}">
@@ -6823,42 +6823,6 @@
           </a:fontRef>
         </p:style>
       </p:cxnSp>
-      <p:cxnSp>
-        <p:nvCxnSpPr>
-          <p:cNvPr id="3" name="直接箭头连接符 2"/>
-          <p:cNvCxnSpPr/>
-          <p:nvPr/>
-        </p:nvCxnSpPr>
-        <p:spPr>
-          <a:xfrm flipH="1">
-            <a:off x="966339" y="5399881"/>
-            <a:ext cx="1675987" cy="0"/>
-          </a:xfrm>
-          <a:prstGeom prst="straightConnector1">
-            <a:avLst/>
-          </a:prstGeom>
-          <a:ln w="57150">
-            <a:solidFill>
-              <a:srgbClr val="010101"/>
-            </a:solidFill>
-            <a:tailEnd type="triangle" w="lg" len="lg"/>
-          </a:ln>
-        </p:spPr>
-        <p:style>
-          <a:lnRef idx="1">
-            <a:schemeClr val="accent1"/>
-          </a:lnRef>
-          <a:fillRef idx="0">
-            <a:schemeClr val="accent1"/>
-          </a:fillRef>
-          <a:effectRef idx="0">
-            <a:schemeClr val="accent1"/>
-          </a:effectRef>
-          <a:fontRef idx="minor">
-            <a:schemeClr val="tx1"/>
-          </a:fontRef>
-        </p:style>
-      </p:cxnSp>
       <p:sp>
         <p:nvSpPr>
           <p:cNvPr id="10" name="椭圆 9"/>
@@ -7105,6 +7069,42 @@
           </a:p>
         </p:txBody>
       </p:sp>
+      <p:cxnSp>
+        <p:nvCxnSpPr>
+          <p:cNvPr id="20" name="直接箭头连接符 19"/>
+          <p:cNvCxnSpPr/>
+          <p:nvPr/>
+        </p:nvCxnSpPr>
+        <p:spPr>
+          <a:xfrm flipH="1">
+            <a:off x="1125993" y="5399881"/>
+            <a:ext cx="1675987" cy="0"/>
+          </a:xfrm>
+          <a:prstGeom prst="straightConnector1">
+            <a:avLst/>
+          </a:prstGeom>
+          <a:ln w="57150">
+            <a:solidFill>
+              <a:srgbClr val="010101"/>
+            </a:solidFill>
+            <a:tailEnd type="triangle" w="lg" len="lg"/>
+          </a:ln>
+        </p:spPr>
+        <p:style>
+          <a:lnRef idx="1">
+            <a:schemeClr val="accent1"/>
+          </a:lnRef>
+          <a:fillRef idx="0">
+            <a:schemeClr val="accent1"/>
+          </a:fillRef>
+          <a:effectRef idx="0">
+            <a:schemeClr val="accent1"/>
+          </a:effectRef>
+          <a:fontRef idx="minor">
+            <a:schemeClr val="tx1"/>
+          </a:fontRef>
+        </p:style>
+      </p:cxnSp>
     </p:spTree>
     <p:extLst>
       <p:ext uri="{BB962C8B-B14F-4D97-AF65-F5344CB8AC3E}">
@@ -7455,42 +7455,6 @@
           </a:fontRef>
         </p:style>
       </p:cxnSp>
-      <p:cxnSp>
-        <p:nvCxnSpPr>
-          <p:cNvPr id="3" name="直接箭头连接符 2"/>
-          <p:cNvCxnSpPr/>
-          <p:nvPr/>
-        </p:nvCxnSpPr>
-        <p:spPr>
-          <a:xfrm flipH="1">
-            <a:off x="966339" y="5399881"/>
-            <a:ext cx="1675987" cy="0"/>
-          </a:xfrm>
-          <a:prstGeom prst="straightConnector1">
-            <a:avLst/>
-          </a:prstGeom>
-          <a:ln w="57150">
-            <a:solidFill>
-              <a:srgbClr val="010101"/>
-            </a:solidFill>
-            <a:tailEnd type="triangle" w="lg" len="lg"/>
-          </a:ln>
-        </p:spPr>
-        <p:style>
-          <a:lnRef idx="1">
-            <a:schemeClr val="accent1"/>
-          </a:lnRef>
-          <a:fillRef idx="0">
-            <a:schemeClr val="accent1"/>
-          </a:fillRef>
-          <a:effectRef idx="0">
-            <a:schemeClr val="accent1"/>
-          </a:effectRef>
-          <a:fontRef idx="minor">
-            <a:schemeClr val="tx1"/>
-          </a:fontRef>
-        </p:style>
-      </p:cxnSp>
       <p:sp>
         <p:nvSpPr>
           <p:cNvPr id="10" name="椭圆 9"/>
@@ -7737,6 +7701,42 @@
           </a:p>
         </p:txBody>
       </p:sp>
+      <p:cxnSp>
+        <p:nvCxnSpPr>
+          <p:cNvPr id="20" name="直接箭头连接符 19"/>
+          <p:cNvCxnSpPr/>
+          <p:nvPr/>
+        </p:nvCxnSpPr>
+        <p:spPr>
+          <a:xfrm flipH="1">
+            <a:off x="1125993" y="5399881"/>
+            <a:ext cx="1675987" cy="0"/>
+          </a:xfrm>
+          <a:prstGeom prst="straightConnector1">
+            <a:avLst/>
+          </a:prstGeom>
+          <a:ln w="57150">
+            <a:solidFill>
+              <a:srgbClr val="010101"/>
+            </a:solidFill>
+            <a:tailEnd type="triangle" w="lg" len="lg"/>
+          </a:ln>
+        </p:spPr>
+        <p:style>
+          <a:lnRef idx="1">
+            <a:schemeClr val="accent1"/>
+          </a:lnRef>
+          <a:fillRef idx="0">
+            <a:schemeClr val="accent1"/>
+          </a:fillRef>
+          <a:effectRef idx="0">
+            <a:schemeClr val="accent1"/>
+          </a:effectRef>
+          <a:fontRef idx="minor">
+            <a:schemeClr val="tx1"/>
+          </a:fontRef>
+        </p:style>
+      </p:cxnSp>
     </p:spTree>
     <p:extLst>
       <p:ext uri="{BB962C8B-B14F-4D97-AF65-F5344CB8AC3E}">

</xml_diff>